<commit_message>
update timeservice interface in quickstart tutorial
</commit_message>
<xml_diff>
--- a/docs/tutorials/quickstart/quickstart-images.pptx
+++ b/docs/tutorials/quickstart/quickstart-images.pptx
@@ -9172,13 +9172,31 @@
               <a:buNone/>
             </a:pPr>
             <a:r>
-              <a:rPr lang="de-DE" altLang="de-DE" sz="1300">
+              <a:rPr lang="de-DE" altLang="de-DE" sz="1300" dirty="0">
                 <a:solidFill>
                   <a:srgbClr val="000000"/>
                 </a:solidFill>
                 <a:cs typeface="Arial" panose="020B0604020202020204" pitchFamily="34" charset="0"/>
               </a:rPr>
-              <a:t>+ getLocation()</a:t>
+              <a:t>+ </a:t>
+            </a:r>
+            <a:r>
+              <a:rPr lang="de-DE" altLang="de-DE" sz="1300" dirty="0" err="1">
+                <a:solidFill>
+                  <a:srgbClr val="000000"/>
+                </a:solidFill>
+                <a:cs typeface="Arial" panose="020B0604020202020204" pitchFamily="34" charset="0"/>
+              </a:rPr>
+              <a:t>getLocation</a:t>
+            </a:r>
+            <a:r>
+              <a:rPr lang="de-DE" altLang="de-DE" sz="1300" dirty="0">
+                <a:solidFill>
+                  <a:srgbClr val="000000"/>
+                </a:solidFill>
+                <a:cs typeface="Arial" panose="020B0604020202020204" pitchFamily="34" charset="0"/>
+              </a:rPr>
+              <a:t>()</a:t>
             </a:r>
           </a:p>
           <a:p>
@@ -9193,14 +9211,38 @@
               <a:buNone/>
             </a:pPr>
             <a:r>
-              <a:rPr lang="de-DE" altLang="de-DE" sz="1300">
+              <a:rPr lang="de-DE" altLang="de-DE" sz="1300" dirty="0">
                 <a:solidFill>
                   <a:srgbClr val="000000"/>
                 </a:solidFill>
                 <a:cs typeface="Arial" panose="020B0604020202020204" pitchFamily="34" charset="0"/>
               </a:rPr>
-              <a:t>+ subscribe()</a:t>
+              <a:t>+ </a:t>
             </a:r>
+            <a:r>
+              <a:rPr lang="de-DE" altLang="de-DE" sz="1300" dirty="0" err="1" smtClean="0">
+                <a:solidFill>
+                  <a:srgbClr val="000000"/>
+                </a:solidFill>
+                <a:cs typeface="Arial" panose="020B0604020202020204" pitchFamily="34" charset="0"/>
+              </a:rPr>
+              <a:t>subscribe</a:t>
+            </a:r>
+            <a:r>
+              <a:rPr lang="de-DE" altLang="de-DE" sz="1300" dirty="0" smtClean="0">
+                <a:solidFill>
+                  <a:srgbClr val="000000"/>
+                </a:solidFill>
+                <a:cs typeface="Arial" panose="020B0604020202020204" pitchFamily="34" charset="0"/>
+              </a:rPr>
+              <a:t>()</a:t>
+            </a:r>
+            <a:endParaRPr lang="de-DE" altLang="de-DE" sz="1300" dirty="0">
+              <a:solidFill>
+                <a:srgbClr val="000000"/>
+              </a:solidFill>
+              <a:cs typeface="Arial" panose="020B0604020202020204" pitchFamily="34" charset="0"/>
+            </a:endParaRPr>
           </a:p>
         </p:txBody>
       </p:sp>
@@ -12008,8 +12050,35 @@
                 <a:uFillTx/>
                 <a:latin typeface="Arial" panose="020B0604020202020204" pitchFamily="34" charset="0"/>
               </a:rPr>
-              <a:t>subscribe()</a:t>
+              <a:t>subscribe</a:t>
             </a:r>
+            <a:r>
+              <a:rPr kumimoji="0" lang="en-US" altLang="de-DE" sz="1000" b="0" i="0" u="none" strike="noStrike" kern="0" cap="none" spc="0" normalizeH="0" baseline="0" noProof="0" smtClean="0">
+                <a:ln>
+                  <a:noFill/>
+                </a:ln>
+                <a:solidFill>
+                  <a:srgbClr val="000000"/>
+                </a:solidFill>
+                <a:effectLst/>
+                <a:uLnTx/>
+                <a:uFillTx/>
+                <a:latin typeface="Arial" panose="020B0604020202020204" pitchFamily="34" charset="0"/>
+              </a:rPr>
+              <a:t>(…)</a:t>
+            </a:r>
+            <a:endParaRPr kumimoji="0" lang="en-US" altLang="de-DE" sz="1000" b="0" i="0" u="none" strike="noStrike" kern="0" cap="none" spc="0" normalizeH="0" baseline="0" noProof="0" smtClean="0">
+              <a:ln>
+                <a:noFill/>
+              </a:ln>
+              <a:solidFill>
+                <a:srgbClr val="000000"/>
+              </a:solidFill>
+              <a:effectLst/>
+              <a:uLnTx/>
+              <a:uFillTx/>
+              <a:latin typeface="Arial" panose="020B0604020202020204" pitchFamily="34" charset="0"/>
+            </a:endParaRPr>
           </a:p>
         </p:txBody>
       </p:sp>

</xml_diff>